<commit_message>
Add light theme styling to presentations
- Remove dark Gamma rectangles from colab.pptx
- Add blue accent bars and rounded column boxes to 01-intro.pptx
- Apply white backgrounds and dark text

Co-Authored-By: Claude Opus 4.5 <noreply@anthropic.com>
</commit_message>
<xml_diff>
--- a/colab.pptx
+++ b/colab.pptx
@@ -7,32 +7,32 @@
   <p:sldIdLst>
     <p:sldId id="256" r:id="rId2"/>
     <p:sldId id="257" r:id="rId3"/>
-    <p:sldId id="299" r:id="rId33"/>
     <p:sldId id="259" r:id="rId4"/>
     <p:sldId id="260" r:id="rId5"/>
     <p:sldId id="261" r:id="rId6"/>
     <p:sldId id="262" r:id="rId7"/>
     <p:sldId id="263" r:id="rId8"/>
     <p:sldId id="264" r:id="rId9"/>
-    <p:sldId id="265" r:id="rId10"/>
-    <p:sldId id="266" r:id="rId11"/>
-    <p:sldId id="267" r:id="rId12"/>
-    <p:sldId id="268" r:id="rId13"/>
-    <p:sldId id="269" r:id="rId14"/>
-    <p:sldId id="270" r:id="rId15"/>
-    <p:sldId id="271" r:id="rId16"/>
-    <p:sldId id="272" r:id="rId17"/>
-    <p:sldId id="273" r:id="rId18"/>
-    <p:sldId id="283" r:id="rId19"/>
-    <p:sldId id="285" r:id="rId20"/>
-    <p:sldId id="296" r:id="rId21"/>
-    <p:sldId id="297" r:id="rId22"/>
-    <p:sldId id="298" r:id="rId23"/>
-    <p:sldId id="288" r:id="rId24"/>
-    <p:sldId id="295" r:id="rId25"/>
-    <p:sldId id="290" r:id="rId26"/>
-    <p:sldId id="291" r:id="rId27"/>
-    <p:sldId id="292" r:id="rId28"/>
+    <p:sldId id="299" r:id="rId10"/>
+    <p:sldId id="265" r:id="rId11"/>
+    <p:sldId id="266" r:id="rId12"/>
+    <p:sldId id="267" r:id="rId13"/>
+    <p:sldId id="268" r:id="rId14"/>
+    <p:sldId id="269" r:id="rId15"/>
+    <p:sldId id="270" r:id="rId16"/>
+    <p:sldId id="271" r:id="rId17"/>
+    <p:sldId id="272" r:id="rId18"/>
+    <p:sldId id="273" r:id="rId19"/>
+    <p:sldId id="283" r:id="rId20"/>
+    <p:sldId id="285" r:id="rId21"/>
+    <p:sldId id="296" r:id="rId22"/>
+    <p:sldId id="297" r:id="rId23"/>
+    <p:sldId id="298" r:id="rId24"/>
+    <p:sldId id="288" r:id="rId25"/>
+    <p:sldId id="295" r:id="rId26"/>
+    <p:sldId id="290" r:id="rId27"/>
+    <p:sldId id="291" r:id="rId28"/>
+    <p:sldId id="292" r:id="rId29"/>
   </p:sldIdLst>
   <p:sldSz cx="14630400" cy="8229600"/>
   <p:notesSz cx="6858000" cy="9144000"/>
@@ -3133,14 +3133,14 @@
         </p:nvSpPr>
         <p:spPr>
           <a:xfrm>
-            <a:off x="6220" y="0"/>
+            <a:off x="12440" y="0"/>
             <a:ext cx="14630400" cy="8229600"/>
           </a:xfrm>
           <a:prstGeom prst="rect">
             <a:avLst/>
           </a:prstGeom>
           <a:solidFill>
-            <a:srgbClr val="121212"/>
+            <a:srgbClr val="FFFFFF"/>
           </a:solidFill>
           <a:ln>
             <a:noFill/>
@@ -3184,7 +3184,7 @@
             <a:avLst/>
           </a:prstGeom>
           <a:solidFill>
-            <a:srgbClr val="D2691E"/>
+            <a:srgbClr val="2563EB"/>
           </a:solidFill>
           <a:ln>
             <a:noFill/>
@@ -3361,7 +3361,7 @@
             <a:avLst/>
           </a:prstGeom>
           <a:solidFill>
-            <a:srgbClr val="D2691E"/>
+            <a:srgbClr val="2563EB"/>
           </a:solidFill>
           <a:ln>
             <a:noFill/>
@@ -3462,7 +3462,7 @@
             <a:avLst/>
           </a:prstGeom>
           <a:solidFill>
-            <a:srgbClr val="121212"/>
+            <a:srgbClr val="FFFFFF"/>
           </a:solidFill>
           <a:ln>
             <a:noFill/>
@@ -3500,7 +3500,7 @@
         <p:spPr>
           <a:xfrm>
             <a:off x="914400" y="731520"/>
-            <a:ext cx="12801600" cy="1097280"/>
+            <a:ext cx="6300123" cy="769441"/>
           </a:xfrm>
           <a:prstGeom prst="rect">
             <a:avLst/>
@@ -3522,13 +3522,18 @@
               </a:defRPr>
             </a:pPr>
             <a:r>
-              <a:rPr>
-                <a:solidFill>
-                  <a:srgbClr val="374151"/>
-                </a:solidFill>
-              </a:rPr>
-              <a:t>Interface Overview</a:t>
-            </a:r>
+              <a:rPr lang="en-US" dirty="0">
+                <a:solidFill>
+                  <a:srgbClr val="374151"/>
+                </a:solidFill>
+              </a:rPr>
+              <a:t>Navigating a Notebook</a:t>
+            </a:r>
+            <a:endParaRPr dirty="0">
+              <a:solidFill>
+                <a:srgbClr val="374151"/>
+              </a:solidFill>
+            </a:endParaRPr>
           </a:p>
         </p:txBody>
       </p:sp>
@@ -3718,7 +3723,7 @@
             <a:avLst/>
           </a:prstGeom>
           <a:solidFill>
-            <a:srgbClr val="D2691E"/>
+            <a:srgbClr val="2563EB"/>
           </a:solidFill>
           <a:ln>
             <a:noFill/>
@@ -3795,7 +3800,7 @@
             <a:avLst/>
           </a:prstGeom>
           <a:solidFill>
-            <a:srgbClr val="121212"/>
+            <a:srgbClr val="FFFFFF"/>
           </a:solidFill>
           <a:ln>
             <a:noFill/>
@@ -4036,7 +4041,7 @@
             <a:avLst/>
           </a:prstGeom>
           <a:solidFill>
-            <a:srgbClr val="D2691E"/>
+            <a:srgbClr val="2563EB"/>
           </a:solidFill>
           <a:ln>
             <a:noFill/>
@@ -4113,7 +4118,7 @@
             <a:avLst/>
           </a:prstGeom>
           <a:solidFill>
-            <a:srgbClr val="121212"/>
+            <a:srgbClr val="FFFFFF"/>
           </a:solidFill>
           <a:ln>
             <a:noFill/>
@@ -4215,8 +4220,8 @@
         </p:nvSpPr>
         <p:spPr>
           <a:xfrm>
-            <a:off x="914400" y="6858000"/>
-            <a:ext cx="12801600" cy="914400"/>
+            <a:off x="4600226" y="6858000"/>
+            <a:ext cx="5429948" cy="400110"/>
           </a:xfrm>
           <a:prstGeom prst="rect">
             <a:avLst/>
@@ -4238,7 +4243,7 @@
               </a:defRPr>
             </a:pPr>
             <a:r>
-              <a:rPr>
+              <a:rPr sz="2000" dirty="0">
                 <a:solidFill>
                   <a:srgbClr val="374151"/>
                 </a:solidFill>
@@ -4296,7 +4301,7 @@
             <a:avLst/>
           </a:prstGeom>
           <a:solidFill>
-            <a:srgbClr val="121212"/>
+            <a:srgbClr val="FFFFFF"/>
           </a:solidFill>
           <a:ln>
             <a:noFill/>
@@ -4479,7 +4484,7 @@
             <a:avLst/>
           </a:prstGeom>
           <a:solidFill>
-            <a:srgbClr val="121212"/>
+            <a:srgbClr val="FFFFFF"/>
           </a:solidFill>
           <a:ln>
             <a:noFill/>
@@ -4746,7 +4751,7 @@
             <a:avLst/>
           </a:prstGeom>
           <a:solidFill>
-            <a:srgbClr val="121212"/>
+            <a:srgbClr val="FFFFFF"/>
           </a:solidFill>
           <a:ln>
             <a:noFill/>
@@ -5008,7 +5013,7 @@
             <a:avLst/>
           </a:prstGeom>
           <a:solidFill>
-            <a:srgbClr val="D2691E"/>
+            <a:srgbClr val="2563EB"/>
           </a:solidFill>
           <a:ln>
             <a:noFill/>
@@ -5085,7 +5090,7 @@
             <a:avLst/>
           </a:prstGeom>
           <a:solidFill>
-            <a:srgbClr val="121212"/>
+            <a:srgbClr val="FFFFFF"/>
           </a:solidFill>
           <a:ln>
             <a:noFill/>
@@ -5335,7 +5340,7 @@
             <a:avLst/>
           </a:prstGeom>
           <a:solidFill>
-            <a:srgbClr val="D2691E"/>
+            <a:srgbClr val="2563EB"/>
           </a:solidFill>
           <a:ln>
             <a:noFill/>
@@ -5412,7 +5417,7 @@
             <a:avLst/>
           </a:prstGeom>
           <a:solidFill>
-            <a:srgbClr val="121212"/>
+            <a:srgbClr val="FFFFFF"/>
           </a:solidFill>
           <a:ln>
             <a:noFill/>
@@ -5660,7 +5665,7 @@
             <a:avLst/>
           </a:prstGeom>
           <a:solidFill>
-            <a:srgbClr val="D2691E"/>
+            <a:srgbClr val="2563EB"/>
           </a:solidFill>
           <a:ln>
             <a:noFill/>
@@ -5710,7 +5715,7 @@
             <a:avLst/>
           </a:prstGeom>
           <a:solidFill>
-            <a:srgbClr val="D2691E"/>
+            <a:srgbClr val="2563EB"/>
           </a:solidFill>
           <a:ln>
             <a:noFill/>
@@ -5787,7 +5792,7 @@
             <a:avLst/>
           </a:prstGeom>
           <a:solidFill>
-            <a:srgbClr val="121212"/>
+            <a:srgbClr val="FFFFFF"/>
           </a:solidFill>
           <a:ln>
             <a:noFill/>
@@ -6035,7 +6040,7 @@
             <a:avLst/>
           </a:prstGeom>
           <a:solidFill>
-            <a:srgbClr val="D2691E"/>
+            <a:srgbClr val="2563EB"/>
           </a:solidFill>
           <a:ln>
             <a:noFill/>
@@ -6085,7 +6090,7 @@
             <a:avLst/>
           </a:prstGeom>
           <a:solidFill>
-            <a:srgbClr val="D2691E"/>
+            <a:srgbClr val="2563EB"/>
           </a:solidFill>
           <a:ln>
             <a:noFill/>
@@ -6162,7 +6167,7 @@
             <a:avLst/>
           </a:prstGeom>
           <a:solidFill>
-            <a:srgbClr val="121212"/>
+            <a:srgbClr val="FFFFFF"/>
           </a:solidFill>
           <a:ln>
             <a:noFill/>
@@ -6345,7 +6350,7 @@
             <a:avLst/>
           </a:prstGeom>
           <a:solidFill>
-            <a:srgbClr val="121212"/>
+            <a:srgbClr val="FFFFFF"/>
           </a:solidFill>
           <a:ln>
             <a:noFill/>
@@ -6582,7 +6587,7 @@
             <a:avLst/>
           </a:prstGeom>
           <a:solidFill>
-            <a:srgbClr val="D2691E"/>
+            <a:srgbClr val="2563EB"/>
           </a:solidFill>
           <a:ln>
             <a:noFill/>
@@ -6659,7 +6664,7 @@
             <a:avLst/>
           </a:prstGeom>
           <a:solidFill>
-            <a:srgbClr val="121212"/>
+            <a:srgbClr val="FFFFFF"/>
           </a:solidFill>
           <a:ln>
             <a:noFill/>
@@ -6872,7 +6877,7 @@
             <a:avLst/>
           </a:prstGeom>
           <a:solidFill>
-            <a:srgbClr val="D2691E"/>
+            <a:srgbClr val="2563EB"/>
           </a:solidFill>
           <a:ln>
             <a:noFill/>
@@ -6949,7 +6954,7 @@
             <a:avLst/>
           </a:prstGeom>
           <a:solidFill>
-            <a:srgbClr val="121212"/>
+            <a:srgbClr val="FFFFFF"/>
           </a:solidFill>
           <a:ln>
             <a:noFill/>
@@ -7050,7 +7055,7 @@
             <a:avLst/>
           </a:prstGeom>
           <a:solidFill>
-            <a:srgbClr val="121212"/>
+            <a:srgbClr val="FFFFFF"/>
           </a:solidFill>
           <a:ln>
             <a:noFill/>
@@ -7151,7 +7156,7 @@
             <a:avLst/>
           </a:prstGeom>
           <a:solidFill>
-            <a:srgbClr val="121212"/>
+            <a:srgbClr val="FFFFFF"/>
           </a:solidFill>
           <a:ln>
             <a:noFill/>
@@ -7252,7 +7257,7 @@
             <a:avLst/>
           </a:prstGeom>
           <a:solidFill>
-            <a:srgbClr val="121212"/>
+            <a:srgbClr val="FFFFFF"/>
           </a:solidFill>
           <a:ln>
             <a:noFill/>
@@ -7509,7 +7514,7 @@
             <a:avLst/>
           </a:prstGeom>
           <a:solidFill>
-            <a:srgbClr val="D2691E"/>
+            <a:srgbClr val="2563EB"/>
           </a:solidFill>
           <a:ln>
             <a:noFill/>
@@ -7586,7 +7591,7 @@
             <a:avLst/>
           </a:prstGeom>
           <a:solidFill>
-            <a:srgbClr val="121212"/>
+            <a:srgbClr val="FFFFFF"/>
           </a:solidFill>
           <a:ln>
             <a:noFill/>
@@ -7880,7 +7885,7 @@
             <a:avLst/>
           </a:prstGeom>
           <a:solidFill>
-            <a:srgbClr val="D2691E"/>
+            <a:srgbClr val="2563EB"/>
           </a:solidFill>
           <a:ln>
             <a:noFill/>
@@ -7957,7 +7962,7 @@
             <a:avLst/>
           </a:prstGeom>
           <a:solidFill>
-            <a:srgbClr val="121212"/>
+            <a:srgbClr val="FFFFFF"/>
           </a:solidFill>
           <a:ln>
             <a:noFill/>
@@ -8214,7 +8219,7 @@
             <a:avLst/>
           </a:prstGeom>
           <a:solidFill>
-            <a:srgbClr val="D2691E"/>
+            <a:srgbClr val="2563EB"/>
           </a:solidFill>
           <a:ln>
             <a:noFill/>
@@ -8291,7 +8296,7 @@
             <a:avLst/>
           </a:prstGeom>
           <a:solidFill>
-            <a:srgbClr val="121212"/>
+            <a:srgbClr val="FFFFFF"/>
           </a:solidFill>
           <a:ln>
             <a:noFill/>
@@ -8596,7 +8601,7 @@
             <a:avLst/>
           </a:prstGeom>
           <a:solidFill>
-            <a:srgbClr val="D2691E"/>
+            <a:srgbClr val="2563EB"/>
           </a:solidFill>
           <a:ln>
             <a:noFill/>
@@ -8673,7 +8678,7 @@
             <a:avLst/>
           </a:prstGeom>
           <a:solidFill>
-            <a:srgbClr val="121212"/>
+            <a:srgbClr val="FFFFFF"/>
           </a:solidFill>
           <a:ln>
             <a:noFill/>
@@ -8937,7 +8942,7 @@
             <a:avLst/>
           </a:prstGeom>
           <a:solidFill>
-            <a:srgbClr val="D2691E"/>
+            <a:srgbClr val="2563EB"/>
           </a:solidFill>
           <a:ln>
             <a:noFill/>
@@ -8975,7 +8980,7 @@
 </file>
 
 <file path=ppt/slides/slide3.xml><?xml version="1.0" encoding="utf-8"?>
-<p:sld xmlns:a="http://schemas.openxmlformats.org/drawingml/2006/main" xmlns:p="http://schemas.openxmlformats.org/presentationml/2006/main" xmlns:r="http://schemas.openxmlformats.org/officeDocument/2006/relationships">
+<p:sld xmlns:a="http://schemas.openxmlformats.org/drawingml/2006/main" xmlns:r="http://schemas.openxmlformats.org/officeDocument/2006/relationships" xmlns:p="http://schemas.openxmlformats.org/presentationml/2006/main">
   <p:cSld>
     <p:bg>
       <p:bgPr>
@@ -8991,17 +8996,109 @@
         <p:cNvGrpSpPr/>
         <p:nvPr/>
       </p:nvGrpSpPr>
-      <p:grpSpPr/>
-      <p:sp>
-        <p:nvSpPr>
-          <p:cNvPr id="2" name="TextBox 1"/>
+      <p:grpSpPr>
+        <a:xfrm>
+          <a:off x="0" y="0"/>
+          <a:ext cx="0" cy="0"/>
+          <a:chOff x="0" y="0"/>
+          <a:chExt cx="0" cy="0"/>
+        </a:xfrm>
+      </p:grpSpPr>
+      <p:sp>
+        <p:nvSpPr>
+          <p:cNvPr id="2" name="Rectangle 1"/>
+          <p:cNvSpPr/>
+          <p:nvPr/>
+        </p:nvSpPr>
+        <p:spPr>
+          <a:xfrm>
+            <a:off x="0" y="0"/>
+            <a:ext cx="14630400" cy="8229600"/>
+          </a:xfrm>
+          <a:prstGeom prst="rect">
+            <a:avLst/>
+          </a:prstGeom>
+          <a:solidFill>
+            <a:srgbClr val="FFFFFF"/>
+          </a:solidFill>
+          <a:ln>
+            <a:noFill/>
+          </a:ln>
+        </p:spPr>
+        <p:style>
+          <a:lnRef idx="1">
+            <a:schemeClr val="accent1"/>
+          </a:lnRef>
+          <a:fillRef idx="3">
+            <a:schemeClr val="accent1"/>
+          </a:fillRef>
+          <a:effectRef idx="2">
+            <a:schemeClr val="accent1"/>
+          </a:effectRef>
+          <a:fontRef idx="minor">
+            <a:schemeClr val="lt1"/>
+          </a:fontRef>
+        </p:style>
+        <p:txBody>
+          <a:bodyPr rtlCol="0" anchor="ctr"/>
+          <a:lstStyle/>
+          <a:p>
+            <a:pPr algn="ctr"/>
+            <a:endParaRPr/>
+          </a:p>
+        </p:txBody>
+      </p:sp>
+      <p:sp>
+        <p:nvSpPr>
+          <p:cNvPr id="3" name="TextBox 2"/>
           <p:cNvSpPr txBox="1"/>
           <p:nvPr/>
         </p:nvSpPr>
         <p:spPr>
           <a:xfrm>
-            <a:off x="793790" y="894278"/>
-            <a:ext cx="13042821" cy="1417558"/>
+            <a:off x="914400" y="731520"/>
+            <a:ext cx="12801600" cy="1097280"/>
+          </a:xfrm>
+          <a:prstGeom prst="rect">
+            <a:avLst/>
+          </a:prstGeom>
+          <a:noFill/>
+        </p:spPr>
+        <p:txBody>
+          <a:bodyPr wrap="none">
+            <a:spAutoFit/>
+          </a:bodyPr>
+          <a:lstStyle/>
+          <a:p>
+            <a:pPr>
+              <a:defRPr sz="4400" b="1">
+                <a:solidFill>
+                  <a:srgbClr val="FFFFFF"/>
+                </a:solidFill>
+                <a:latin typeface="Arial"/>
+              </a:defRPr>
+            </a:pPr>
+            <a:r>
+              <a:rPr>
+                <a:solidFill>
+                  <a:srgbClr val="374151"/>
+                </a:solidFill>
+              </a:rPr>
+              <a:t>What You Need</a:t>
+            </a:r>
+          </a:p>
+        </p:txBody>
+      </p:sp>
+      <p:sp>
+        <p:nvSpPr>
+          <p:cNvPr id="4" name="TextBox 3"/>
+          <p:cNvSpPr txBox="1"/>
+          <p:nvPr/>
+        </p:nvSpPr>
+        <p:spPr>
+          <a:xfrm>
+            <a:off x="914400" y="2011680"/>
+            <a:ext cx="12801600" cy="5486400"/>
           </a:xfrm>
           <a:prstGeom prst="rect">
             <a:avLst/>
@@ -9014,416 +9111,115 @@
           </a:bodyPr>
           <a:lstStyle/>
           <a:p>
-            <a:pPr algn="l"/>
-            <a:r>
-              <a:rPr sz="4450" b="1">
-                <a:solidFill>
-                  <a:srgbClr val="111827"/>
-                </a:solidFill>
-                <a:latin typeface="Inter Bold"/>
-              </a:rPr>
-              <a:t>How Notebooks Work: The Runtime Connection</a:t>
-            </a:r>
-          </a:p>
-        </p:txBody>
-      </p:sp>
-      <p:pic>
-        <p:nvPicPr>
-          <p:cNvPr id="3" name="Picture 2" descr="image.png"/>
-          <p:cNvPicPr>
-            <a:picLocks noChangeAspect="1"/>
-          </p:cNvPicPr>
-          <p:nvPr/>
-        </p:nvPicPr>
-        <p:blipFill>
-          <a:blip r:embed="rId2"/>
-          <a:stretch>
-            <a:fillRect/>
-          </a:stretch>
-        </p:blipFill>
-        <p:spPr>
-          <a:xfrm>
-            <a:off x="793790" y="2907149"/>
-            <a:ext cx="5564862" cy="2546866"/>
-          </a:xfrm>
-          <a:prstGeom prst="rect">
-            <a:avLst/>
-          </a:prstGeom>
-        </p:spPr>
-      </p:pic>
-      <p:pic>
-        <p:nvPicPr>
-          <p:cNvPr id="4" name="Picture 3" descr="image.png"/>
-          <p:cNvPicPr>
-            <a:picLocks noChangeAspect="1"/>
-          </p:cNvPicPr>
-          <p:nvPr/>
-        </p:nvPicPr>
-        <p:blipFill>
-          <a:blip r:embed="rId3"/>
-          <a:stretch>
-            <a:fillRect/>
-          </a:stretch>
-        </p:blipFill>
-        <p:spPr>
-          <a:xfrm>
-            <a:off x="5373611" y="3543033"/>
-            <a:ext cx="357797" cy="357797"/>
-          </a:xfrm>
-          <a:prstGeom prst="rect">
-            <a:avLst/>
-          </a:prstGeom>
-        </p:spPr>
-      </p:pic>
-      <p:sp>
-        <p:nvSpPr>
-          <p:cNvPr id="5" name="TextBox 4"/>
-          <p:cNvSpPr txBox="1"/>
-          <p:nvPr/>
-        </p:nvSpPr>
-        <p:spPr>
-          <a:xfrm>
-            <a:off x="5054837" y="4748584"/>
-            <a:ext cx="1044766" cy="402521"/>
-          </a:xfrm>
-          <a:prstGeom prst="rect">
-            <a:avLst/>
-          </a:prstGeom>
-          <a:noFill/>
-        </p:spPr>
-        <p:txBody>
-          <a:bodyPr wrap="square">
-            <a:spAutoFit/>
-          </a:bodyPr>
-          <a:lstStyle/>
-          <a:p>
-            <a:pPr algn="ctr"/>
-            <a:r>
-              <a:rPr sz="1350" b="1">
-                <a:solidFill>
-                  <a:srgbClr val="374151"/>
-                </a:solidFill>
-                <a:latin typeface="Inter Bold"/>
-              </a:rPr>
-              <a:t>Display Results</a:t>
-            </a:r>
-          </a:p>
-        </p:txBody>
-      </p:sp>
-      <p:pic>
-        <p:nvPicPr>
-          <p:cNvPr id="6" name="Picture 5" descr="image.png"/>
-          <p:cNvPicPr>
-            <a:picLocks noChangeAspect="1"/>
-          </p:cNvPicPr>
-          <p:nvPr/>
-        </p:nvPicPr>
-        <p:blipFill>
-          <a:blip r:embed="rId3"/>
-          <a:stretch>
-            <a:fillRect/>
-          </a:stretch>
-        </p:blipFill>
-        <p:spPr>
-          <a:xfrm>
-            <a:off x="4063740" y="3543704"/>
-            <a:ext cx="357797" cy="357796"/>
-          </a:xfrm>
-          <a:prstGeom prst="rect">
-            <a:avLst/>
-          </a:prstGeom>
-        </p:spPr>
-      </p:pic>
-      <p:sp>
-        <p:nvSpPr>
-          <p:cNvPr id="7" name="TextBox 6"/>
-          <p:cNvSpPr txBox="1"/>
-          <p:nvPr/>
-        </p:nvSpPr>
-        <p:spPr>
-          <a:xfrm>
-            <a:off x="3738145" y="4748584"/>
-            <a:ext cx="1044766" cy="402521"/>
-          </a:xfrm>
-          <a:prstGeom prst="rect">
-            <a:avLst/>
-          </a:prstGeom>
-          <a:noFill/>
-        </p:spPr>
-        <p:txBody>
-          <a:bodyPr wrap="square">
-            <a:spAutoFit/>
-          </a:bodyPr>
-          <a:lstStyle/>
-          <a:p>
-            <a:pPr algn="ctr"/>
-            <a:r>
-              <a:rPr sz="1350" b="1">
-                <a:solidFill>
-                  <a:srgbClr val="374151"/>
-                </a:solidFill>
-                <a:latin typeface="Inter Bold"/>
-              </a:rPr>
-              <a:t>Return Output</a:t>
-            </a:r>
-          </a:p>
-        </p:txBody>
-      </p:sp>
-      <p:pic>
-        <p:nvPicPr>
-          <p:cNvPr id="8" name="Picture 7" descr="image.png"/>
-          <p:cNvPicPr>
-            <a:picLocks noChangeAspect="1"/>
-          </p:cNvPicPr>
-          <p:nvPr/>
-        </p:nvPicPr>
-        <p:blipFill>
-          <a:blip r:embed="rId3"/>
-          <a:stretch>
-            <a:fillRect/>
-          </a:stretch>
-        </p:blipFill>
-        <p:spPr>
-          <a:xfrm>
-            <a:off x="2754205" y="3543704"/>
-            <a:ext cx="357797" cy="357796"/>
-          </a:xfrm>
-          <a:prstGeom prst="rect">
-            <a:avLst/>
-          </a:prstGeom>
-        </p:spPr>
-      </p:pic>
-      <p:sp>
-        <p:nvSpPr>
-          <p:cNvPr id="9" name="TextBox 8"/>
-          <p:cNvSpPr txBox="1"/>
-          <p:nvPr/>
-        </p:nvSpPr>
-        <p:spPr>
-          <a:xfrm>
-            <a:off x="2428610" y="4849214"/>
-            <a:ext cx="1044766" cy="201261"/>
-          </a:xfrm>
-          <a:prstGeom prst="rect">
-            <a:avLst/>
-          </a:prstGeom>
-          <a:noFill/>
-        </p:spPr>
-        <p:txBody>
-          <a:bodyPr wrap="none">
-            <a:spAutoFit/>
-          </a:bodyPr>
-          <a:lstStyle/>
-          <a:p>
-            <a:pPr algn="ctr"/>
-            <a:r>
-              <a:rPr sz="1350" b="1">
-                <a:solidFill>
-                  <a:srgbClr val="374151"/>
-                </a:solidFill>
-                <a:latin typeface="Inter Bold"/>
-              </a:rPr>
-              <a:t>Execute</a:t>
-            </a:r>
-          </a:p>
-        </p:txBody>
-      </p:sp>
-      <p:pic>
-        <p:nvPicPr>
-          <p:cNvPr id="10" name="Picture 9" descr="image.png"/>
-          <p:cNvPicPr>
-            <a:picLocks noChangeAspect="1"/>
-          </p:cNvPicPr>
-          <p:nvPr/>
-        </p:nvPicPr>
-        <p:blipFill>
-          <a:blip r:embed="rId3"/>
-          <a:stretch>
-            <a:fillRect/>
-          </a:stretch>
-        </p:blipFill>
-        <p:spPr>
-          <a:xfrm>
-            <a:off x="1437513" y="3543704"/>
-            <a:ext cx="357797" cy="357796"/>
-          </a:xfrm>
-          <a:prstGeom prst="rect">
-            <a:avLst/>
-          </a:prstGeom>
-        </p:spPr>
-      </p:pic>
-      <p:sp>
-        <p:nvSpPr>
-          <p:cNvPr id="11" name="TextBox 10"/>
-          <p:cNvSpPr txBox="1"/>
-          <p:nvPr/>
-        </p:nvSpPr>
-        <p:spPr>
-          <a:xfrm>
-            <a:off x="1090451" y="4849214"/>
-            <a:ext cx="1044766" cy="201261"/>
-          </a:xfrm>
-          <a:prstGeom prst="rect">
-            <a:avLst/>
-          </a:prstGeom>
-          <a:noFill/>
-        </p:spPr>
-        <p:txBody>
-          <a:bodyPr wrap="none">
-            <a:spAutoFit/>
-          </a:bodyPr>
-          <a:lstStyle/>
-          <a:p>
-            <a:pPr algn="ctr"/>
-            <a:r>
-              <a:rPr sz="1350" b="1">
-                <a:solidFill>
-                  <a:srgbClr val="374151"/>
-                </a:solidFill>
-                <a:latin typeface="Inter Bold"/>
-              </a:rPr>
-              <a:t>Send Code</a:t>
-            </a:r>
-          </a:p>
-        </p:txBody>
-      </p:sp>
-      <p:sp>
-        <p:nvSpPr>
-          <p:cNvPr id="12" name="TextBox 11"/>
-          <p:cNvSpPr txBox="1"/>
-          <p:nvPr/>
-        </p:nvSpPr>
-        <p:spPr>
-          <a:xfrm>
-            <a:off x="6919674" y="2856071"/>
-            <a:ext cx="6924437" cy="725805"/>
-          </a:xfrm>
-          <a:prstGeom prst="rect">
-            <a:avLst/>
-          </a:prstGeom>
-          <a:noFill/>
-        </p:spPr>
-        <p:txBody>
-          <a:bodyPr wrap="square">
-            <a:spAutoFit/>
-          </a:bodyPr>
-          <a:lstStyle/>
-          <a:p>
-            <a:pPr algn="l"/>
-            <a:r>
-              <a:rPr sz="1750">
-                <a:solidFill>
-                  <a:srgbClr val="374151"/>
-                </a:solidFill>
-                <a:latin typeface="Inter"/>
-              </a:rPr>
-              <a:t>Think of a Jupyter notebook as a conversation between you and a computer. Here's the workflow:</a:t>
-            </a:r>
-          </a:p>
-        </p:txBody>
-      </p:sp>
-      <p:sp>
-        <p:nvSpPr>
-          <p:cNvPr id="13" name="TextBox 12"/>
-          <p:cNvSpPr txBox="1"/>
-          <p:nvPr/>
-        </p:nvSpPr>
-        <p:spPr>
-          <a:xfrm>
-            <a:off x="6919674" y="3785949"/>
-            <a:ext cx="6924437" cy="2177548"/>
-          </a:xfrm>
-          <a:prstGeom prst="rect">
-            <a:avLst/>
-          </a:prstGeom>
-          <a:noFill/>
-        </p:spPr>
-        <p:txBody>
-          <a:bodyPr wrap="square">
-            <a:spAutoFit/>
-          </a:bodyPr>
-          <a:lstStyle/>
-          <a:p>
-            <a:pPr algn="l"/>
-            <a:r>
-              <a:rPr sz="1750">
-                <a:solidFill>
-                  <a:srgbClr val="374151"/>
-                </a:solidFill>
-                <a:latin typeface="Inter"/>
-              </a:rPr>
-              <a:t>Your notebook transmits code to a runtime environment (called a kernel)</a:t>
-            </a:r>
-          </a:p>
-          <a:p>
-            <a:pPr algn="l"/>
-            <a:r>
-              <a:rPr sz="1750">
-                <a:solidFill>
-                  <a:srgbClr val="374151"/>
-                </a:solidFill>
-                <a:latin typeface="Inter"/>
-              </a:rPr>
-              <a:t>The runtime processes and executes your code</a:t>
-            </a:r>
-          </a:p>
-          <a:p>
-            <a:pPr algn="l"/>
-            <a:r>
-              <a:rPr sz="1750">
-                <a:solidFill>
-                  <a:srgbClr val="374151"/>
-                </a:solidFill>
-                <a:latin typeface="Inter"/>
-              </a:rPr>
-              <a:t>Results flow back to the notebook interface</a:t>
-            </a:r>
-          </a:p>
-          <a:p>
-            <a:pPr algn="l"/>
-            <a:r>
-              <a:rPr sz="1750">
-                <a:solidFill>
-                  <a:srgbClr val="374151"/>
-                </a:solidFill>
-                <a:latin typeface="Inter"/>
-              </a:rPr>
-              <a:t>The notebook renders outputs, visualizations, and any error messages</a:t>
-            </a:r>
-          </a:p>
-        </p:txBody>
-      </p:sp>
-      <p:sp>
-        <p:nvSpPr>
-          <p:cNvPr id="14" name="TextBox 13"/>
-          <p:cNvSpPr txBox="1"/>
-          <p:nvPr/>
-        </p:nvSpPr>
-        <p:spPr>
-          <a:xfrm>
-            <a:off x="6919674" y="6167570"/>
-            <a:ext cx="6924437" cy="725805"/>
-          </a:xfrm>
-          <a:prstGeom prst="rect">
-            <a:avLst/>
-          </a:prstGeom>
-          <a:noFill/>
-        </p:spPr>
-        <p:txBody>
-          <a:bodyPr wrap="square">
-            <a:spAutoFit/>
-          </a:bodyPr>
-          <a:lstStyle/>
-          <a:p>
-            <a:pPr algn="l"/>
-            <a:r>
-              <a:rPr sz="1750">
-                <a:solidFill>
-                  <a:srgbClr val="374151"/>
-                </a:solidFill>
-                <a:latin typeface="Inter"/>
-              </a:rPr>
-              <a:t>This interactive loop enables rapid experimentation and immediate feedback—essential for learning and development.</a:t>
+            <a:pPr>
+              <a:spcBef>
+                <a:spcPts val="800"/>
+              </a:spcBef>
+              <a:defRPr sz="2400">
+                <a:solidFill>
+                  <a:srgbClr val="FFFFFF"/>
+                </a:solidFill>
+                <a:latin typeface="Arial"/>
+              </a:defRPr>
+            </a:pPr>
+            <a:r>
+              <a:rPr>
+                <a:solidFill>
+                  <a:srgbClr val="374151"/>
+                </a:solidFill>
+              </a:rPr>
+              <a:t>Just two things:</a:t>
+            </a:r>
+          </a:p>
+          <a:p>
+            <a:pPr>
+              <a:spcBef>
+                <a:spcPts val="800"/>
+              </a:spcBef>
+              <a:defRPr sz="2400">
+                <a:solidFill>
+                  <a:srgbClr val="FFFFFF"/>
+                </a:solidFill>
+                <a:latin typeface="Arial"/>
+              </a:defRPr>
+            </a:pPr>
+            <a:endParaRPr/>
+          </a:p>
+          <a:p>
+            <a:pPr>
+              <a:spcBef>
+                <a:spcPts val="800"/>
+              </a:spcBef>
+              <a:defRPr sz="2400">
+                <a:solidFill>
+                  <a:srgbClr val="FFFFFF"/>
+                </a:solidFill>
+                <a:latin typeface="Arial"/>
+              </a:defRPr>
+            </a:pPr>
+            <a:r>
+              <a:rPr>
+                <a:solidFill>
+                  <a:srgbClr val="374151"/>
+                </a:solidFill>
+              </a:rPr>
+              <a:t>1. A Google account (Gmail works)</a:t>
+            </a:r>
+          </a:p>
+          <a:p>
+            <a:pPr>
+              <a:spcBef>
+                <a:spcPts val="800"/>
+              </a:spcBef>
+              <a:defRPr sz="2400">
+                <a:solidFill>
+                  <a:srgbClr val="FFFFFF"/>
+                </a:solidFill>
+                <a:latin typeface="Arial"/>
+              </a:defRPr>
+            </a:pPr>
+            <a:r>
+              <a:rPr>
+                <a:solidFill>
+                  <a:srgbClr val="374151"/>
+                </a:solidFill>
+              </a:rPr>
+              <a:t>2. A web browser (Chrome recommended)</a:t>
+            </a:r>
+          </a:p>
+          <a:p>
+            <a:pPr>
+              <a:spcBef>
+                <a:spcPts val="800"/>
+              </a:spcBef>
+              <a:defRPr sz="2400">
+                <a:solidFill>
+                  <a:srgbClr val="FFFFFF"/>
+                </a:solidFill>
+                <a:latin typeface="Arial"/>
+              </a:defRPr>
+            </a:pPr>
+            <a:endParaRPr/>
+          </a:p>
+          <a:p>
+            <a:pPr>
+              <a:spcBef>
+                <a:spcPts val="800"/>
+              </a:spcBef>
+              <a:defRPr sz="2400">
+                <a:solidFill>
+                  <a:srgbClr val="FFFFFF"/>
+                </a:solidFill>
+                <a:latin typeface="Arial"/>
+              </a:defRPr>
+            </a:pPr>
+            <a:r>
+              <a:rPr>
+                <a:solidFill>
+                  <a:srgbClr val="374151"/>
+                </a:solidFill>
+              </a:rPr>
+              <a:t>That's it!</a:t>
             </a:r>
           </a:p>
         </p:txBody>
@@ -9476,7 +9272,7 @@
             <a:avLst/>
           </a:prstGeom>
           <a:solidFill>
-            <a:srgbClr val="121212"/>
+            <a:srgbClr val="FFFFFF"/>
           </a:solidFill>
           <a:ln>
             <a:noFill/>
@@ -9541,21 +9337,45 @@
                   <a:srgbClr val="374151"/>
                 </a:solidFill>
               </a:rPr>
-              <a:t>What You Need</a:t>
-            </a:r>
-          </a:p>
-        </p:txBody>
-      </p:sp>
-      <p:sp>
-        <p:nvSpPr>
-          <p:cNvPr id="4" name="TextBox 3"/>
+              <a:t>Accessing Colab: From Google Drive</a:t>
+            </a:r>
+          </a:p>
+        </p:txBody>
+      </p:sp>
+      <p:pic>
+        <p:nvPicPr>
+          <p:cNvPr id="4" name="Picture 3" descr="colab-access.png"/>
+          <p:cNvPicPr>
+            <a:picLocks noChangeAspect="1"/>
+          </p:cNvPicPr>
+          <p:nvPr/>
+        </p:nvPicPr>
+        <p:blipFill>
+          <a:blip r:embed="rId2"/>
+          <a:stretch>
+            <a:fillRect/>
+          </a:stretch>
+        </p:blipFill>
+        <p:spPr>
+          <a:xfrm>
+            <a:off x="1828800" y="1828800"/>
+            <a:ext cx="10972800" cy="4472430"/>
+          </a:xfrm>
+          <a:prstGeom prst="rect">
+            <a:avLst/>
+          </a:prstGeom>
+        </p:spPr>
+      </p:pic>
+      <p:sp>
+        <p:nvSpPr>
+          <p:cNvPr id="5" name="TextBox 4"/>
           <p:cNvSpPr txBox="1"/>
           <p:nvPr/>
         </p:nvSpPr>
         <p:spPr>
           <a:xfrm>
-            <a:off x="914400" y="2011680"/>
-            <a:ext cx="12801600" cy="5486400"/>
+            <a:off x="914400" y="6858000"/>
+            <a:ext cx="12801600" cy="914400"/>
           </a:xfrm>
           <a:prstGeom prst="rect">
             <a:avLst/>
@@ -9563,18 +9383,15 @@
           <a:noFill/>
         </p:spPr>
         <p:txBody>
-          <a:bodyPr wrap="square">
+          <a:bodyPr wrap="none">
             <a:spAutoFit/>
           </a:bodyPr>
           <a:lstStyle/>
           <a:p>
-            <a:pPr>
-              <a:spcBef>
-                <a:spcPts val="800"/>
-              </a:spcBef>
-              <a:defRPr sz="2400">
-                <a:solidFill>
-                  <a:srgbClr val="FFFFFF"/>
+            <a:pPr algn="ctr">
+              <a:defRPr sz="2000">
+                <a:solidFill>
+                  <a:srgbClr val="B4B4B4"/>
                 </a:solidFill>
                 <a:latin typeface="Arial"/>
               </a:defRPr>
@@ -9585,98 +9402,7 @@
                   <a:srgbClr val="374151"/>
                 </a:solidFill>
               </a:rPr>
-              <a:t>Just two things:</a:t>
-            </a:r>
-          </a:p>
-          <a:p>
-            <a:pPr>
-              <a:spcBef>
-                <a:spcPts val="800"/>
-              </a:spcBef>
-              <a:defRPr sz="2400">
-                <a:solidFill>
-                  <a:srgbClr val="FFFFFF"/>
-                </a:solidFill>
-                <a:latin typeface="Arial"/>
-              </a:defRPr>
-            </a:pPr>
-            <a:endParaRPr/>
-          </a:p>
-          <a:p>
-            <a:pPr>
-              <a:spcBef>
-                <a:spcPts val="800"/>
-              </a:spcBef>
-              <a:defRPr sz="2400">
-                <a:solidFill>
-                  <a:srgbClr val="FFFFFF"/>
-                </a:solidFill>
-                <a:latin typeface="Arial"/>
-              </a:defRPr>
-            </a:pPr>
-            <a:r>
-              <a:rPr>
-                <a:solidFill>
-                  <a:srgbClr val="374151"/>
-                </a:solidFill>
-              </a:rPr>
-              <a:t>1. A Google account (Gmail works)</a:t>
-            </a:r>
-          </a:p>
-          <a:p>
-            <a:pPr>
-              <a:spcBef>
-                <a:spcPts val="800"/>
-              </a:spcBef>
-              <a:defRPr sz="2400">
-                <a:solidFill>
-                  <a:srgbClr val="FFFFFF"/>
-                </a:solidFill>
-                <a:latin typeface="Arial"/>
-              </a:defRPr>
-            </a:pPr>
-            <a:r>
-              <a:rPr>
-                <a:solidFill>
-                  <a:srgbClr val="374151"/>
-                </a:solidFill>
-              </a:rPr>
-              <a:t>2. A web browser (Chrome recommended)</a:t>
-            </a:r>
-          </a:p>
-          <a:p>
-            <a:pPr>
-              <a:spcBef>
-                <a:spcPts val="800"/>
-              </a:spcBef>
-              <a:defRPr sz="2400">
-                <a:solidFill>
-                  <a:srgbClr val="FFFFFF"/>
-                </a:solidFill>
-                <a:latin typeface="Arial"/>
-              </a:defRPr>
-            </a:pPr>
-            <a:endParaRPr/>
-          </a:p>
-          <a:p>
-            <a:pPr>
-              <a:spcBef>
-                <a:spcPts val="800"/>
-              </a:spcBef>
-              <a:defRPr sz="2400">
-                <a:solidFill>
-                  <a:srgbClr val="FFFFFF"/>
-                </a:solidFill>
-                <a:latin typeface="Arial"/>
-              </a:defRPr>
-            </a:pPr>
-            <a:r>
-              <a:rPr>
-                <a:solidFill>
-                  <a:srgbClr val="374151"/>
-                </a:solidFill>
-              </a:rPr>
-              <a:t>That's it!</a:t>
+              <a:t>Click New → More → Google Colaboratory</a:t>
             </a:r>
           </a:p>
         </p:txBody>
@@ -9729,7 +9455,7 @@
             <a:avLst/>
           </a:prstGeom>
           <a:solidFill>
-            <a:srgbClr val="121212"/>
+            <a:srgbClr val="FFFFFF"/>
           </a:solidFill>
           <a:ln>
             <a:noFill/>
@@ -9794,45 +9520,21 @@
                   <a:srgbClr val="374151"/>
                 </a:solidFill>
               </a:rPr>
-              <a:t>Accessing Colab: From Google Drive</a:t>
-            </a:r>
-          </a:p>
-        </p:txBody>
-      </p:sp>
-      <p:pic>
-        <p:nvPicPr>
-          <p:cNvPr id="4" name="Picture 3" descr="colab-access.png"/>
-          <p:cNvPicPr>
-            <a:picLocks noChangeAspect="1"/>
-          </p:cNvPicPr>
-          <p:nvPr/>
-        </p:nvPicPr>
-        <p:blipFill>
-          <a:blip r:embed="rId2"/>
-          <a:stretch>
-            <a:fillRect/>
-          </a:stretch>
-        </p:blipFill>
-        <p:spPr>
-          <a:xfrm>
-            <a:off x="1828800" y="1828800"/>
-            <a:ext cx="10972800" cy="4472430"/>
-          </a:xfrm>
-          <a:prstGeom prst="rect">
-            <a:avLst/>
-          </a:prstGeom>
-        </p:spPr>
-      </p:pic>
-      <p:sp>
-        <p:nvSpPr>
-          <p:cNvPr id="5" name="TextBox 4"/>
+              <a:t>Accessing Colab: Direct</a:t>
+            </a:r>
+          </a:p>
+        </p:txBody>
+      </p:sp>
+      <p:sp>
+        <p:nvSpPr>
+          <p:cNvPr id="4" name="TextBox 3"/>
           <p:cNvSpPr txBox="1"/>
           <p:nvPr/>
         </p:nvSpPr>
         <p:spPr>
           <a:xfrm>
-            <a:off x="914400" y="6858000"/>
-            <a:ext cx="12801600" cy="914400"/>
+            <a:off x="914400" y="2011680"/>
+            <a:ext cx="12801600" cy="5486400"/>
           </a:xfrm>
           <a:prstGeom prst="rect">
             <a:avLst/>
@@ -9840,26 +9542,65 @@
           <a:noFill/>
         </p:spPr>
         <p:txBody>
-          <a:bodyPr wrap="none">
+          <a:bodyPr wrap="square">
             <a:spAutoFit/>
           </a:bodyPr>
           <a:lstStyle/>
           <a:p>
-            <a:pPr algn="ctr">
-              <a:defRPr sz="2000">
-                <a:solidFill>
-                  <a:srgbClr val="B4B4B4"/>
-                </a:solidFill>
-                <a:latin typeface="Arial"/>
-              </a:defRPr>
-            </a:pPr>
-            <a:r>
-              <a:rPr>
-                <a:solidFill>
-                  <a:srgbClr val="374151"/>
-                </a:solidFill>
-              </a:rPr>
-              <a:t>Click New → More → Google Colaboratory</a:t>
+            <a:pPr>
+              <a:spcBef>
+                <a:spcPts val="800"/>
+              </a:spcBef>
+              <a:defRPr sz="2400">
+                <a:solidFill>
+                  <a:srgbClr val="FFFFFF"/>
+                </a:solidFill>
+                <a:latin typeface="Arial"/>
+              </a:defRPr>
+            </a:pPr>
+            <a:r>
+              <a:rPr dirty="0">
+                <a:solidFill>
+                  <a:srgbClr val="374151"/>
+                </a:solidFill>
+              </a:rPr>
+              <a:t>Go directly to:</a:t>
+            </a:r>
+          </a:p>
+          <a:p>
+            <a:pPr>
+              <a:spcBef>
+                <a:spcPts val="800"/>
+              </a:spcBef>
+              <a:defRPr sz="2400">
+                <a:solidFill>
+                  <a:srgbClr val="FFFFFF"/>
+                </a:solidFill>
+                <a:latin typeface="Arial"/>
+              </a:defRPr>
+            </a:pPr>
+            <a:endParaRPr dirty="0"/>
+          </a:p>
+          <a:p>
+            <a:pPr>
+              <a:spcBef>
+                <a:spcPts val="800"/>
+              </a:spcBef>
+              <a:defRPr sz="2400">
+                <a:solidFill>
+                  <a:srgbClr val="FFFFFF"/>
+                </a:solidFill>
+                <a:latin typeface="Arial"/>
+              </a:defRPr>
+            </a:pPr>
+            <a:r>
+              <a:rPr dirty="0">
+                <a:solidFill>
+                  <a:srgbClr val="374151"/>
+                </a:solidFill>
+                <a:hlinkClick r:id="rId2"/>
+              </a:rPr>
+              <a:t>colab.research.google.com</a:t>
             </a:r>
           </a:p>
         </p:txBody>
@@ -9912,7 +9653,7 @@
             <a:avLst/>
           </a:prstGeom>
           <a:solidFill>
-            <a:srgbClr val="121212"/>
+            <a:srgbClr val="FFFFFF"/>
           </a:solidFill>
           <a:ln>
             <a:noFill/>
@@ -9977,91 +9718,35 @@
                   <a:srgbClr val="374151"/>
                 </a:solidFill>
               </a:rPr>
-              <a:t>Accessing Colab: Direct</a:t>
-            </a:r>
-          </a:p>
-        </p:txBody>
-      </p:sp>
-      <p:sp>
-        <p:nvSpPr>
-          <p:cNvPr id="4" name="TextBox 3"/>
-          <p:cNvSpPr txBox="1"/>
-          <p:nvPr/>
-        </p:nvSpPr>
-        <p:spPr>
-          <a:xfrm>
-            <a:off x="914400" y="2011680"/>
-            <a:ext cx="12801600" cy="5486400"/>
-          </a:xfrm>
-          <a:prstGeom prst="rect">
-            <a:avLst/>
-          </a:prstGeom>
-          <a:noFill/>
-        </p:spPr>
-        <p:txBody>
-          <a:bodyPr wrap="square">
-            <a:spAutoFit/>
-          </a:bodyPr>
-          <a:lstStyle/>
-          <a:p>
-            <a:pPr>
-              <a:spcBef>
-                <a:spcPts val="800"/>
-              </a:spcBef>
-              <a:defRPr sz="2400">
-                <a:solidFill>
-                  <a:srgbClr val="FFFFFF"/>
-                </a:solidFill>
-                <a:latin typeface="Arial"/>
-              </a:defRPr>
-            </a:pPr>
-            <a:r>
-              <a:rPr dirty="0">
-                <a:solidFill>
-                  <a:srgbClr val="374151"/>
-                </a:solidFill>
-              </a:rPr>
-              <a:t>Go directly to:</a:t>
-            </a:r>
-          </a:p>
-          <a:p>
-            <a:pPr>
-              <a:spcBef>
-                <a:spcPts val="800"/>
-              </a:spcBef>
-              <a:defRPr sz="2400">
-                <a:solidFill>
-                  <a:srgbClr val="FFFFFF"/>
-                </a:solidFill>
-                <a:latin typeface="Arial"/>
-              </a:defRPr>
-            </a:pPr>
-            <a:endParaRPr dirty="0"/>
-          </a:p>
-          <a:p>
-            <a:pPr>
-              <a:spcBef>
-                <a:spcPts val="800"/>
-              </a:spcBef>
-              <a:defRPr sz="2400">
-                <a:solidFill>
-                  <a:srgbClr val="FFFFFF"/>
-                </a:solidFill>
-                <a:latin typeface="Arial"/>
-              </a:defRPr>
-            </a:pPr>
-            <a:r>
-              <a:rPr dirty="0">
-                <a:solidFill>
-                  <a:srgbClr val="374151"/>
-                </a:solidFill>
-                <a:hlinkClick r:id="rId2"/>
-              </a:rPr>
-              <a:t>colab.research.google.com</a:t>
-            </a:r>
-          </a:p>
-        </p:txBody>
-      </p:sp>
+              <a:t>The Open Notebook Dialog</a:t>
+            </a:r>
+          </a:p>
+        </p:txBody>
+      </p:sp>
+      <p:pic>
+        <p:nvPicPr>
+          <p:cNvPr id="4" name="Picture 3" descr="colab1.png"/>
+          <p:cNvPicPr>
+            <a:picLocks noChangeAspect="1"/>
+          </p:cNvPicPr>
+          <p:nvPr/>
+        </p:nvPicPr>
+        <p:blipFill>
+          <a:blip r:embed="rId2"/>
+          <a:stretch>
+            <a:fillRect/>
+          </a:stretch>
+        </p:blipFill>
+        <p:spPr>
+          <a:xfrm>
+            <a:off x="1828800" y="1828800"/>
+            <a:ext cx="10972800" cy="6685287"/>
+          </a:xfrm>
+          <a:prstGeom prst="rect">
+            <a:avLst/>
+          </a:prstGeom>
+        </p:spPr>
+      </p:pic>
     </p:spTree>
   </p:cSld>
   <p:clrMapOvr>
@@ -10110,7 +9795,7 @@
             <a:avLst/>
           </a:prstGeom>
           <a:solidFill>
-            <a:srgbClr val="121212"/>
+            <a:srgbClr val="FFFFFF"/>
           </a:solidFill>
           <a:ln>
             <a:noFill/>
@@ -10175,35 +9860,286 @@
                   <a:srgbClr val="374151"/>
                 </a:solidFill>
               </a:rPr>
-              <a:t>The Open Notebook Dialog</a:t>
-            </a:r>
-          </a:p>
-        </p:txBody>
-      </p:sp>
-      <p:pic>
-        <p:nvPicPr>
-          <p:cNvPr id="4" name="Picture 3" descr="colab1.png"/>
-          <p:cNvPicPr>
-            <a:picLocks noChangeAspect="1"/>
-          </p:cNvPicPr>
-          <p:nvPr/>
-        </p:nvPicPr>
-        <p:blipFill>
-          <a:blip r:embed="rId2"/>
-          <a:stretch>
-            <a:fillRect/>
-          </a:stretch>
-        </p:blipFill>
-        <p:spPr>
-          <a:xfrm>
-            <a:off x="1828800" y="1828800"/>
-            <a:ext cx="10972800" cy="6685287"/>
-          </a:xfrm>
-          <a:prstGeom prst="rect">
-            <a:avLst/>
-          </a:prstGeom>
-        </p:spPr>
-      </p:pic>
+              <a:t>Opening Notebooks</a:t>
+            </a:r>
+          </a:p>
+        </p:txBody>
+      </p:sp>
+      <p:sp>
+        <p:nvSpPr>
+          <p:cNvPr id="4" name="TextBox 3"/>
+          <p:cNvSpPr txBox="1"/>
+          <p:nvPr/>
+        </p:nvSpPr>
+        <p:spPr>
+          <a:xfrm>
+            <a:off x="914400" y="2011680"/>
+            <a:ext cx="12801600" cy="2821285"/>
+          </a:xfrm>
+          <a:prstGeom prst="rect">
+            <a:avLst/>
+          </a:prstGeom>
+          <a:noFill/>
+        </p:spPr>
+        <p:txBody>
+          <a:bodyPr wrap="square">
+            <a:spAutoFit/>
+          </a:bodyPr>
+          <a:lstStyle/>
+          <a:p>
+            <a:pPr>
+              <a:spcBef>
+                <a:spcPts val="800"/>
+              </a:spcBef>
+              <a:defRPr sz="2400">
+                <a:solidFill>
+                  <a:srgbClr val="FFFFFF"/>
+                </a:solidFill>
+                <a:latin typeface="Arial"/>
+              </a:defRPr>
+            </a:pPr>
+            <a:r>
+              <a:rPr dirty="0">
+                <a:solidFill>
+                  <a:srgbClr val="374151"/>
+                </a:solidFill>
+              </a:rPr>
+              <a:t>• Examples: Google's tutorial notebooks</a:t>
+            </a:r>
+          </a:p>
+          <a:p>
+            <a:pPr>
+              <a:spcBef>
+                <a:spcPts val="800"/>
+              </a:spcBef>
+              <a:defRPr sz="2400">
+                <a:solidFill>
+                  <a:srgbClr val="FFFFFF"/>
+                </a:solidFill>
+                <a:latin typeface="Arial"/>
+              </a:defRPr>
+            </a:pPr>
+            <a:r>
+              <a:rPr dirty="0">
+                <a:solidFill>
+                  <a:srgbClr val="374151"/>
+                </a:solidFill>
+              </a:rPr>
+              <a:t>• Recent: Your recently opened notebooks</a:t>
+            </a:r>
+          </a:p>
+          <a:p>
+            <a:pPr>
+              <a:spcBef>
+                <a:spcPts val="800"/>
+              </a:spcBef>
+              <a:defRPr sz="2400">
+                <a:solidFill>
+                  <a:srgbClr val="FFFFFF"/>
+                </a:solidFill>
+                <a:latin typeface="Arial"/>
+              </a:defRPr>
+            </a:pPr>
+            <a:r>
+              <a:rPr dirty="0">
+                <a:solidFill>
+                  <a:srgbClr val="374151"/>
+                </a:solidFill>
+              </a:rPr>
+              <a:t>• Google Drive: Notebooks saved in your Drive</a:t>
+            </a:r>
+          </a:p>
+          <a:p>
+            <a:pPr>
+              <a:spcBef>
+                <a:spcPts val="800"/>
+              </a:spcBef>
+              <a:defRPr sz="2400">
+                <a:solidFill>
+                  <a:srgbClr val="FFFFFF"/>
+                </a:solidFill>
+                <a:latin typeface="Arial"/>
+              </a:defRPr>
+            </a:pPr>
+            <a:r>
+              <a:rPr dirty="0">
+                <a:solidFill>
+                  <a:srgbClr val="374151"/>
+                </a:solidFill>
+              </a:rPr>
+              <a:t>• GitHub: Open notebooks from GitHub repos</a:t>
+            </a:r>
+          </a:p>
+          <a:p>
+            <a:pPr>
+              <a:spcBef>
+                <a:spcPts val="800"/>
+              </a:spcBef>
+              <a:defRPr sz="2400">
+                <a:solidFill>
+                  <a:srgbClr val="FFFFFF"/>
+                </a:solidFill>
+                <a:latin typeface="Arial"/>
+              </a:defRPr>
+            </a:pPr>
+            <a:r>
+              <a:rPr dirty="0">
+                <a:solidFill>
+                  <a:srgbClr val="374151"/>
+                </a:solidFill>
+              </a:rPr>
+              <a:t>• Upload: Upload a .</a:t>
+            </a:r>
+            <a:r>
+              <a:rPr dirty="0" err="1">
+                <a:solidFill>
+                  <a:srgbClr val="374151"/>
+                </a:solidFill>
+              </a:rPr>
+              <a:t>ipynb</a:t>
+            </a:r>
+            <a:r>
+              <a:rPr dirty="0">
+                <a:solidFill>
+                  <a:srgbClr val="374151"/>
+                </a:solidFill>
+              </a:rPr>
+              <a:t> file</a:t>
+            </a:r>
+          </a:p>
+          <a:p>
+            <a:pPr>
+              <a:spcBef>
+                <a:spcPts val="800"/>
+              </a:spcBef>
+              <a:defRPr sz="2400">
+                <a:solidFill>
+                  <a:srgbClr val="FFFFFF"/>
+                </a:solidFill>
+                <a:latin typeface="Arial"/>
+              </a:defRPr>
+            </a:pPr>
+            <a:endParaRPr lang="en-US" dirty="0"/>
+          </a:p>
+        </p:txBody>
+      </p:sp>
+      <p:sp>
+        <p:nvSpPr>
+          <p:cNvPr id="5" name="Rectangle 4"/>
+          <p:cNvSpPr/>
+          <p:nvPr/>
+        </p:nvSpPr>
+        <p:spPr>
+          <a:xfrm flipH="1">
+            <a:off x="702906" y="2090057"/>
+            <a:ext cx="74334" cy="2202026"/>
+          </a:xfrm>
+          <a:prstGeom prst="rect">
+            <a:avLst/>
+          </a:prstGeom>
+          <a:solidFill>
+            <a:srgbClr val="2563EB"/>
+          </a:solidFill>
+          <a:ln>
+            <a:noFill/>
+          </a:ln>
+        </p:spPr>
+        <p:style>
+          <a:lnRef idx="1">
+            <a:schemeClr val="accent1"/>
+          </a:lnRef>
+          <a:fillRef idx="3">
+            <a:schemeClr val="accent1"/>
+          </a:fillRef>
+          <a:effectRef idx="2">
+            <a:schemeClr val="accent1"/>
+          </a:effectRef>
+          <a:fontRef idx="minor">
+            <a:schemeClr val="lt1"/>
+          </a:fontRef>
+        </p:style>
+        <p:txBody>
+          <a:bodyPr rtlCol="0" anchor="ctr"/>
+          <a:lstStyle/>
+          <a:p>
+            <a:pPr algn="ctr"/>
+            <a:endParaRPr/>
+          </a:p>
+        </p:txBody>
+      </p:sp>
+      <p:sp>
+        <p:nvSpPr>
+          <p:cNvPr id="6" name="TextBox 5">
+            <a:extLst>
+              <a:ext uri="{FF2B5EF4-FFF2-40B4-BE49-F238E27FC236}">
+                <a16:creationId xmlns:a16="http://schemas.microsoft.com/office/drawing/2014/main" id="{3D131BFF-E8BC-B2BF-821D-30ED819C5D14}"/>
+              </a:ext>
+            </a:extLst>
+          </p:cNvPr>
+          <p:cNvSpPr txBox="1"/>
+          <p:nvPr/>
+        </p:nvSpPr>
+        <p:spPr>
+          <a:xfrm>
+            <a:off x="653142" y="5015845"/>
+            <a:ext cx="7184571" cy="738664"/>
+          </a:xfrm>
+          <a:prstGeom prst="rect">
+            <a:avLst/>
+          </a:prstGeom>
+          <a:noFill/>
+        </p:spPr>
+        <p:txBody>
+          <a:bodyPr wrap="square" rtlCol="0">
+            <a:spAutoFit/>
+          </a:bodyPr>
+          <a:lstStyle/>
+          <a:p>
+            <a:pPr marL="0" marR="0" lvl="0" indent="0" algn="l" defTabSz="457200" rtl="0" eaLnBrk="1" fontAlgn="auto" latinLnBrk="0" hangingPunct="1">
+              <a:lnSpc>
+                <a:spcPct val="100000"/>
+              </a:lnSpc>
+              <a:spcBef>
+                <a:spcPts val="800"/>
+              </a:spcBef>
+              <a:spcAft>
+                <a:spcPts val="0"/>
+              </a:spcAft>
+              <a:buClrTx/>
+              <a:buSzTx/>
+              <a:buFontTx/>
+              <a:buNone/>
+              <a:tabLst/>
+              <a:defRPr sz="2400">
+                <a:solidFill>
+                  <a:srgbClr val="FFFFFF"/>
+                </a:solidFill>
+                <a:latin typeface="Arial"/>
+              </a:defRPr>
+            </a:pPr>
+            <a:r>
+              <a:rPr kumimoji="0" lang="en-US" sz="2400" b="0" i="0" u="none" strike="noStrike" kern="1200" cap="none" spc="0" normalizeH="0" baseline="0" noProof="0" dirty="0">
+                <a:ln>
+                  <a:noFill/>
+                </a:ln>
+                <a:solidFill>
+                  <a:srgbClr val="111827"/>
+                </a:solidFill>
+                <a:effectLst/>
+                <a:uLnTx/>
+                <a:uFillTx/>
+                <a:latin typeface="Arial"/>
+                <a:ea typeface="+mn-ea"/>
+                <a:cs typeface="+mn-cs"/>
+              </a:rPr>
+              <a:t>Click + New notebook to start a fresh notebook</a:t>
+            </a:r>
+          </a:p>
+          <a:p>
+            <a:endParaRPr lang="en-US" dirty="0"/>
+          </a:p>
+        </p:txBody>
+      </p:sp>
     </p:spTree>
   </p:cSld>
   <p:clrMapOvr>
@@ -10252,7 +10188,7 @@
             <a:avLst/>
           </a:prstGeom>
           <a:solidFill>
-            <a:srgbClr val="121212"/>
+            <a:srgbClr val="FFFFFF"/>
           </a:solidFill>
           <a:ln>
             <a:noFill/>
@@ -10290,7 +10226,7 @@
         <p:spPr>
           <a:xfrm>
             <a:off x="914400" y="731520"/>
-            <a:ext cx="12801600" cy="1097280"/>
+            <a:ext cx="10927992" cy="769441"/>
           </a:xfrm>
           <a:prstGeom prst="rect">
             <a:avLst/>
@@ -10312,291 +10248,69 @@
               </a:defRPr>
             </a:pPr>
             <a:r>
-              <a:rPr>
-                <a:solidFill>
-                  <a:srgbClr val="374151"/>
-                </a:solidFill>
-              </a:rPr>
-              <a:t>Opening Notebooks</a:t>
-            </a:r>
-          </a:p>
-        </p:txBody>
-      </p:sp>
-      <p:sp>
-        <p:nvSpPr>
-          <p:cNvPr id="4" name="TextBox 3"/>
-          <p:cNvSpPr txBox="1"/>
-          <p:nvPr/>
-        </p:nvSpPr>
-        <p:spPr>
-          <a:xfrm>
-            <a:off x="914400" y="2011680"/>
-            <a:ext cx="12801600" cy="2821285"/>
-          </a:xfrm>
-          <a:prstGeom prst="rect">
-            <a:avLst/>
-          </a:prstGeom>
-          <a:noFill/>
-        </p:spPr>
-        <p:txBody>
-          <a:bodyPr wrap="square">
-            <a:spAutoFit/>
-          </a:bodyPr>
-          <a:lstStyle/>
-          <a:p>
-            <a:pPr>
-              <a:spcBef>
-                <a:spcPts val="800"/>
-              </a:spcBef>
-              <a:defRPr sz="2400">
-                <a:solidFill>
-                  <a:srgbClr val="FFFFFF"/>
-                </a:solidFill>
-                <a:latin typeface="Arial"/>
-              </a:defRPr>
-            </a:pPr>
-            <a:r>
               <a:rPr dirty="0">
                 <a:solidFill>
                   <a:srgbClr val="374151"/>
                 </a:solidFill>
               </a:rPr>
-              <a:t>• Examples: Google's tutorial notebooks</a:t>
-            </a:r>
-          </a:p>
-          <a:p>
-            <a:pPr>
-              <a:spcBef>
-                <a:spcPts val="800"/>
-              </a:spcBef>
-              <a:defRPr sz="2400">
-                <a:solidFill>
-                  <a:srgbClr val="FFFFFF"/>
-                </a:solidFill>
-                <a:latin typeface="Arial"/>
-              </a:defRPr>
-            </a:pPr>
+              <a:t>The </a:t>
+            </a:r>
+            <a:r>
+              <a:rPr dirty="0" err="1">
+                <a:solidFill>
+                  <a:srgbClr val="374151"/>
+                </a:solidFill>
+              </a:rPr>
+              <a:t>Colab</a:t>
+            </a:r>
             <a:r>
               <a:rPr dirty="0">
                 <a:solidFill>
                   <a:srgbClr val="374151"/>
                 </a:solidFill>
               </a:rPr>
-              <a:t>• Recent: Your recently opened notebooks</a:t>
-            </a:r>
-          </a:p>
-          <a:p>
-            <a:pPr>
-              <a:spcBef>
-                <a:spcPts val="800"/>
-              </a:spcBef>
-              <a:defRPr sz="2400">
-                <a:solidFill>
-                  <a:srgbClr val="FFFFFF"/>
-                </a:solidFill>
-                <a:latin typeface="Arial"/>
-              </a:defRPr>
-            </a:pPr>
-            <a:r>
-              <a:rPr dirty="0">
-                <a:solidFill>
-                  <a:srgbClr val="374151"/>
-                </a:solidFill>
-              </a:rPr>
-              <a:t>• Google Drive: Notebooks saved in your Drive</a:t>
-            </a:r>
-          </a:p>
-          <a:p>
-            <a:pPr>
-              <a:spcBef>
-                <a:spcPts val="800"/>
-              </a:spcBef>
-              <a:defRPr sz="2400">
-                <a:solidFill>
-                  <a:srgbClr val="FFFFFF"/>
-                </a:solidFill>
-                <a:latin typeface="Arial"/>
-              </a:defRPr>
-            </a:pPr>
-            <a:r>
-              <a:rPr dirty="0">
-                <a:solidFill>
-                  <a:srgbClr val="374151"/>
-                </a:solidFill>
-              </a:rPr>
-              <a:t>• GitHub: Open notebooks from GitHub repos</a:t>
-            </a:r>
-          </a:p>
-          <a:p>
-            <a:pPr>
-              <a:spcBef>
-                <a:spcPts val="800"/>
-              </a:spcBef>
-              <a:defRPr sz="2400">
-                <a:solidFill>
-                  <a:srgbClr val="FFFFFF"/>
-                </a:solidFill>
-                <a:latin typeface="Arial"/>
-              </a:defRPr>
-            </a:pPr>
-            <a:r>
-              <a:rPr dirty="0">
-                <a:solidFill>
-                  <a:srgbClr val="374151"/>
-                </a:solidFill>
-              </a:rPr>
-              <a:t>• Upload: Upload a .</a:t>
-            </a:r>
-            <a:r>
-              <a:rPr dirty="0" err="1">
-                <a:solidFill>
-                  <a:srgbClr val="374151"/>
-                </a:solidFill>
-              </a:rPr>
-              <a:t>ipynb</a:t>
-            </a:r>
-            <a:r>
-              <a:rPr dirty="0">
-                <a:solidFill>
-                  <a:srgbClr val="374151"/>
-                </a:solidFill>
-              </a:rPr>
-              <a:t> file</a:t>
-            </a:r>
-          </a:p>
-          <a:p>
-            <a:pPr>
-              <a:spcBef>
-                <a:spcPts val="800"/>
-              </a:spcBef>
-              <a:defRPr sz="2400">
-                <a:solidFill>
-                  <a:srgbClr val="FFFFFF"/>
-                </a:solidFill>
-                <a:latin typeface="Arial"/>
-              </a:defRPr>
-            </a:pPr>
-            <a:endParaRPr lang="en-US" dirty="0"/>
-          </a:p>
-        </p:txBody>
-      </p:sp>
-      <p:sp>
-        <p:nvSpPr>
-          <p:cNvPr id="5" name="Rectangle 4"/>
-          <p:cNvSpPr/>
-          <p:nvPr/>
-        </p:nvSpPr>
-        <p:spPr>
-          <a:xfrm flipH="1">
-            <a:off x="702906" y="2090057"/>
-            <a:ext cx="74334" cy="2202026"/>
-          </a:xfrm>
-          <a:prstGeom prst="rect">
-            <a:avLst/>
-          </a:prstGeom>
-          <a:solidFill>
-            <a:srgbClr val="D2691E"/>
-          </a:solidFill>
-          <a:ln>
-            <a:noFill/>
-          </a:ln>
-        </p:spPr>
-        <p:style>
-          <a:lnRef idx="1">
-            <a:schemeClr val="accent1"/>
-          </a:lnRef>
-          <a:fillRef idx="3">
-            <a:schemeClr val="accent1"/>
-          </a:fillRef>
-          <a:effectRef idx="2">
-            <a:schemeClr val="accent1"/>
-          </a:effectRef>
-          <a:fontRef idx="minor">
-            <a:schemeClr val="lt1"/>
-          </a:fontRef>
-        </p:style>
-        <p:txBody>
-          <a:bodyPr rtlCol="0" anchor="ctr"/>
-          <a:lstStyle/>
-          <a:p>
-            <a:pPr algn="ctr"/>
-            <a:endParaRPr/>
-          </a:p>
-        </p:txBody>
-      </p:sp>
-      <p:sp>
-        <p:nvSpPr>
-          <p:cNvPr id="6" name="TextBox 5">
-            <a:extLst>
-              <a:ext uri="{FF2B5EF4-FFF2-40B4-BE49-F238E27FC236}">
-                <a16:creationId xmlns:a16="http://schemas.microsoft.com/office/drawing/2014/main" id="{3D131BFF-E8BC-B2BF-821D-30ED819C5D14}"/>
-              </a:ext>
-            </a:extLst>
-          </p:cNvPr>
-          <p:cNvSpPr txBox="1"/>
-          <p:nvPr/>
-        </p:nvSpPr>
-        <p:spPr>
-          <a:xfrm>
-            <a:off x="653142" y="5015845"/>
-            <a:ext cx="7184571" cy="738664"/>
-          </a:xfrm>
-          <a:prstGeom prst="rect">
-            <a:avLst/>
-          </a:prstGeom>
-          <a:noFill/>
-        </p:spPr>
-        <p:txBody>
-          <a:bodyPr wrap="square" rtlCol="0">
-            <a:spAutoFit/>
-          </a:bodyPr>
-          <a:lstStyle/>
-          <a:p>
-            <a:pPr marL="0" marR="0" lvl="0" indent="0" algn="l" defTabSz="457200" rtl="0" eaLnBrk="1" fontAlgn="auto" latinLnBrk="0" hangingPunct="1">
-              <a:lnSpc>
-                <a:spcPct val="100000"/>
-              </a:lnSpc>
-              <a:spcBef>
-                <a:spcPts val="800"/>
-              </a:spcBef>
-              <a:spcAft>
-                <a:spcPts val="0"/>
-              </a:spcAft>
-              <a:buClrTx/>
-              <a:buSzTx/>
-              <a:buFontTx/>
-              <a:buNone/>
-              <a:tabLst/>
-              <a:defRPr sz="2400">
-                <a:solidFill>
-                  <a:srgbClr val="FFFFFF"/>
-                </a:solidFill>
-                <a:latin typeface="Arial"/>
-              </a:defRPr>
-            </a:pPr>
-            <a:r>
-              <a:rPr kumimoji="0" lang="en-US" sz="2400" b="0" i="0" u="none" strike="noStrike" kern="1200" cap="none" spc="0" normalizeH="0" baseline="0" noProof="0" dirty="0">
-                <a:ln>
-                  <a:noFill/>
-                </a:ln>
-                <a:solidFill>
-                  <a:srgbClr val="111827"/>
-                </a:solidFill>
-                <a:effectLst/>
-                <a:uLnTx/>
-                <a:uFillTx/>
-                <a:latin typeface="Arial"/>
-                <a:ea typeface="+mn-ea"/>
-                <a:cs typeface="+mn-cs"/>
-              </a:rPr>
-              <a:t>Click + New notebook to start a fresh notebook</a:t>
-            </a:r>
-          </a:p>
-          <a:p>
-            <a:endParaRPr lang="en-US" dirty="0"/>
-          </a:p>
-        </p:txBody>
-      </p:sp>
+              <a:t> Interface</a:t>
+            </a:r>
+            <a:r>
+              <a:rPr lang="en-US" dirty="0">
+                <a:solidFill>
+                  <a:srgbClr val="374151"/>
+                </a:solidFill>
+              </a:rPr>
+              <a:t>: Notebook + Gemini</a:t>
+            </a:r>
+            <a:endParaRPr dirty="0">
+              <a:solidFill>
+                <a:srgbClr val="374151"/>
+              </a:solidFill>
+            </a:endParaRPr>
+          </a:p>
+        </p:txBody>
+      </p:sp>
+      <p:pic>
+        <p:nvPicPr>
+          <p:cNvPr id="4" name="Picture 3" descr="colab2.png"/>
+          <p:cNvPicPr>
+            <a:picLocks noChangeAspect="1"/>
+          </p:cNvPicPr>
+          <p:nvPr/>
+        </p:nvPicPr>
+        <p:blipFill>
+          <a:blip r:embed="rId2"/>
+          <a:stretch>
+            <a:fillRect/>
+          </a:stretch>
+        </p:blipFill>
+        <p:spPr>
+          <a:xfrm>
+            <a:off x="1828800" y="1828800"/>
+            <a:ext cx="10400522" cy="6224889"/>
+          </a:xfrm>
+          <a:prstGeom prst="rect">
+            <a:avLst/>
+          </a:prstGeom>
+        </p:spPr>
+      </p:pic>
     </p:spTree>
   </p:cSld>
   <p:clrMapOvr>
@@ -10632,58 +10346,14 @@
       </p:grpSpPr>
       <p:sp>
         <p:nvSpPr>
-          <p:cNvPr id="2" name="Rectangle 1"/>
-          <p:cNvSpPr/>
-          <p:nvPr/>
-        </p:nvSpPr>
-        <p:spPr>
-          <a:xfrm>
-            <a:off x="0" y="0"/>
-            <a:ext cx="14630400" cy="8229600"/>
-          </a:xfrm>
-          <a:prstGeom prst="rect">
-            <a:avLst/>
-          </a:prstGeom>
-          <a:solidFill>
-            <a:srgbClr val="121212"/>
-          </a:solidFill>
-          <a:ln>
-            <a:noFill/>
-          </a:ln>
-        </p:spPr>
-        <p:style>
-          <a:lnRef idx="1">
-            <a:schemeClr val="accent1"/>
-          </a:lnRef>
-          <a:fillRef idx="3">
-            <a:schemeClr val="accent1"/>
-          </a:fillRef>
-          <a:effectRef idx="2">
-            <a:schemeClr val="accent1"/>
-          </a:effectRef>
-          <a:fontRef idx="minor">
-            <a:schemeClr val="lt1"/>
-          </a:fontRef>
-        </p:style>
-        <p:txBody>
-          <a:bodyPr rtlCol="0" anchor="ctr"/>
-          <a:lstStyle/>
-          <a:p>
-            <a:pPr algn="ctr"/>
-            <a:endParaRPr/>
-          </a:p>
-        </p:txBody>
-      </p:sp>
-      <p:sp>
-        <p:nvSpPr>
-          <p:cNvPr id="3" name="TextBox 2"/>
+          <p:cNvPr id="2" name="TextBox 1"/>
           <p:cNvSpPr txBox="1"/>
           <p:nvPr/>
         </p:nvSpPr>
         <p:spPr>
           <a:xfrm>
-            <a:off x="914400" y="731520"/>
-            <a:ext cx="12801600" cy="1097280"/>
+            <a:off x="793790" y="894278"/>
+            <a:ext cx="13042821" cy="1417558"/>
           </a:xfrm>
           <a:prstGeom prst="rect">
             <a:avLst/>
@@ -10691,33 +10361,27 @@
           <a:noFill/>
         </p:spPr>
         <p:txBody>
-          <a:bodyPr wrap="none">
+          <a:bodyPr wrap="square">
             <a:spAutoFit/>
           </a:bodyPr>
           <a:lstStyle/>
           <a:p>
-            <a:pPr>
-              <a:defRPr sz="4400" b="1">
-                <a:solidFill>
-                  <a:srgbClr val="FFFFFF"/>
-                </a:solidFill>
-                <a:latin typeface="Arial"/>
-              </a:defRPr>
-            </a:pPr>
-            <a:r>
-              <a:rPr>
-                <a:solidFill>
-                  <a:srgbClr val="374151"/>
-                </a:solidFill>
-              </a:rPr>
-              <a:t>The Colab Interface</a:t>
+            <a:pPr algn="l"/>
+            <a:r>
+              <a:rPr sz="4450" b="1">
+                <a:solidFill>
+                  <a:srgbClr val="111827"/>
+                </a:solidFill>
+                <a:latin typeface="Inter Bold"/>
+              </a:rPr>
+              <a:t>How Notebooks Work: The Runtime Connection</a:t>
             </a:r>
           </a:p>
         </p:txBody>
       </p:sp>
       <p:pic>
         <p:nvPicPr>
-          <p:cNvPr id="4" name="Picture 3" descr="colab2.png"/>
+          <p:cNvPr id="3" name="Picture 2" descr="image.png"/>
           <p:cNvPicPr>
             <a:picLocks noChangeAspect="1"/>
           </p:cNvPicPr>
@@ -10731,14 +10395,440 @@
         </p:blipFill>
         <p:spPr>
           <a:xfrm>
-            <a:off x="1828800" y="1828800"/>
-            <a:ext cx="10972800" cy="6567407"/>
+            <a:off x="793790" y="2907149"/>
+            <a:ext cx="5564862" cy="2546866"/>
           </a:xfrm>
           <a:prstGeom prst="rect">
             <a:avLst/>
           </a:prstGeom>
         </p:spPr>
       </p:pic>
+      <p:pic>
+        <p:nvPicPr>
+          <p:cNvPr id="4" name="Picture 3" descr="image.png"/>
+          <p:cNvPicPr>
+            <a:picLocks noChangeAspect="1"/>
+          </p:cNvPicPr>
+          <p:nvPr/>
+        </p:nvPicPr>
+        <p:blipFill>
+          <a:blip r:embed="rId3"/>
+          <a:stretch>
+            <a:fillRect/>
+          </a:stretch>
+        </p:blipFill>
+        <p:spPr>
+          <a:xfrm>
+            <a:off x="5373611" y="3543033"/>
+            <a:ext cx="357797" cy="357797"/>
+          </a:xfrm>
+          <a:prstGeom prst="rect">
+            <a:avLst/>
+          </a:prstGeom>
+        </p:spPr>
+      </p:pic>
+      <p:sp>
+        <p:nvSpPr>
+          <p:cNvPr id="5" name="TextBox 4"/>
+          <p:cNvSpPr txBox="1"/>
+          <p:nvPr/>
+        </p:nvSpPr>
+        <p:spPr>
+          <a:xfrm>
+            <a:off x="5054837" y="4748584"/>
+            <a:ext cx="1044766" cy="646331"/>
+          </a:xfrm>
+          <a:prstGeom prst="rect">
+            <a:avLst/>
+          </a:prstGeom>
+          <a:noFill/>
+        </p:spPr>
+        <p:txBody>
+          <a:bodyPr wrap="square">
+            <a:spAutoFit/>
+          </a:bodyPr>
+          <a:lstStyle/>
+          <a:p>
+            <a:pPr algn="ctr"/>
+            <a:r>
+              <a:rPr b="1" dirty="0">
+                <a:solidFill>
+                  <a:srgbClr val="374151"/>
+                </a:solidFill>
+                <a:latin typeface="Inter Bold"/>
+              </a:rPr>
+              <a:t>Display Results</a:t>
+            </a:r>
+          </a:p>
+        </p:txBody>
+      </p:sp>
+      <p:pic>
+        <p:nvPicPr>
+          <p:cNvPr id="6" name="Picture 5" descr="image.png"/>
+          <p:cNvPicPr>
+            <a:picLocks noChangeAspect="1"/>
+          </p:cNvPicPr>
+          <p:nvPr/>
+        </p:nvPicPr>
+        <p:blipFill>
+          <a:blip r:embed="rId3"/>
+          <a:stretch>
+            <a:fillRect/>
+          </a:stretch>
+        </p:blipFill>
+        <p:spPr>
+          <a:xfrm>
+            <a:off x="4063740" y="3543704"/>
+            <a:ext cx="357797" cy="357796"/>
+          </a:xfrm>
+          <a:prstGeom prst="rect">
+            <a:avLst/>
+          </a:prstGeom>
+        </p:spPr>
+      </p:pic>
+      <p:sp>
+        <p:nvSpPr>
+          <p:cNvPr id="7" name="TextBox 6"/>
+          <p:cNvSpPr txBox="1"/>
+          <p:nvPr/>
+        </p:nvSpPr>
+        <p:spPr>
+          <a:xfrm>
+            <a:off x="3738145" y="4748584"/>
+            <a:ext cx="1044766" cy="584775"/>
+          </a:xfrm>
+          <a:prstGeom prst="rect">
+            <a:avLst/>
+          </a:prstGeom>
+          <a:noFill/>
+        </p:spPr>
+        <p:txBody>
+          <a:bodyPr wrap="square">
+            <a:spAutoFit/>
+          </a:bodyPr>
+          <a:lstStyle/>
+          <a:p>
+            <a:pPr algn="ctr"/>
+            <a:r>
+              <a:rPr sz="1600" b="1" dirty="0">
+                <a:solidFill>
+                  <a:srgbClr val="374151"/>
+                </a:solidFill>
+                <a:latin typeface="Inter Bold"/>
+              </a:rPr>
+              <a:t>Return Output</a:t>
+            </a:r>
+          </a:p>
+        </p:txBody>
+      </p:sp>
+      <p:pic>
+        <p:nvPicPr>
+          <p:cNvPr id="8" name="Picture 7" descr="image.png"/>
+          <p:cNvPicPr>
+            <a:picLocks noChangeAspect="1"/>
+          </p:cNvPicPr>
+          <p:nvPr/>
+        </p:nvPicPr>
+        <p:blipFill>
+          <a:blip r:embed="rId3"/>
+          <a:stretch>
+            <a:fillRect/>
+          </a:stretch>
+        </p:blipFill>
+        <p:spPr>
+          <a:xfrm>
+            <a:off x="2754205" y="3543704"/>
+            <a:ext cx="357797" cy="357796"/>
+          </a:xfrm>
+          <a:prstGeom prst="rect">
+            <a:avLst/>
+          </a:prstGeom>
+        </p:spPr>
+      </p:pic>
+      <p:sp>
+        <p:nvSpPr>
+          <p:cNvPr id="9" name="TextBox 8"/>
+          <p:cNvSpPr txBox="1"/>
+          <p:nvPr/>
+        </p:nvSpPr>
+        <p:spPr>
+          <a:xfrm>
+            <a:off x="2416230" y="4849214"/>
+            <a:ext cx="1069525" cy="369332"/>
+          </a:xfrm>
+          <a:prstGeom prst="rect">
+            <a:avLst/>
+          </a:prstGeom>
+          <a:noFill/>
+        </p:spPr>
+        <p:txBody>
+          <a:bodyPr wrap="none">
+            <a:spAutoFit/>
+          </a:bodyPr>
+          <a:lstStyle/>
+          <a:p>
+            <a:pPr algn="ctr"/>
+            <a:r>
+              <a:rPr b="1" dirty="0">
+                <a:solidFill>
+                  <a:srgbClr val="374151"/>
+                </a:solidFill>
+                <a:latin typeface="Inter Bold"/>
+              </a:rPr>
+              <a:t>Execute</a:t>
+            </a:r>
+          </a:p>
+        </p:txBody>
+      </p:sp>
+      <p:pic>
+        <p:nvPicPr>
+          <p:cNvPr id="10" name="Picture 9" descr="image.png"/>
+          <p:cNvPicPr>
+            <a:picLocks noChangeAspect="1"/>
+          </p:cNvPicPr>
+          <p:nvPr/>
+        </p:nvPicPr>
+        <p:blipFill>
+          <a:blip r:embed="rId3"/>
+          <a:stretch>
+            <a:fillRect/>
+          </a:stretch>
+        </p:blipFill>
+        <p:spPr>
+          <a:xfrm>
+            <a:off x="1437513" y="3543704"/>
+            <a:ext cx="357797" cy="357796"/>
+          </a:xfrm>
+          <a:prstGeom prst="rect">
+            <a:avLst/>
+          </a:prstGeom>
+        </p:spPr>
+      </p:pic>
+      <p:sp>
+        <p:nvSpPr>
+          <p:cNvPr id="11" name="TextBox 10"/>
+          <p:cNvSpPr txBox="1"/>
+          <p:nvPr/>
+        </p:nvSpPr>
+        <p:spPr>
+          <a:xfrm>
+            <a:off x="957847" y="4849214"/>
+            <a:ext cx="1309974" cy="369332"/>
+          </a:xfrm>
+          <a:prstGeom prst="rect">
+            <a:avLst/>
+          </a:prstGeom>
+          <a:noFill/>
+        </p:spPr>
+        <p:txBody>
+          <a:bodyPr wrap="none">
+            <a:spAutoFit/>
+          </a:bodyPr>
+          <a:lstStyle/>
+          <a:p>
+            <a:pPr algn="ctr"/>
+            <a:r>
+              <a:rPr sz="1600" b="1" dirty="0">
+                <a:solidFill>
+                  <a:srgbClr val="374151"/>
+                </a:solidFill>
+                <a:latin typeface="Inter Bold"/>
+              </a:rPr>
+              <a:t>Send</a:t>
+            </a:r>
+            <a:r>
+              <a:rPr sz="1350" b="1" dirty="0">
+                <a:solidFill>
+                  <a:srgbClr val="374151"/>
+                </a:solidFill>
+                <a:latin typeface="Inter Bold"/>
+              </a:rPr>
+              <a:t> </a:t>
+            </a:r>
+            <a:r>
+              <a:rPr b="1" dirty="0">
+                <a:solidFill>
+                  <a:srgbClr val="374151"/>
+                </a:solidFill>
+                <a:latin typeface="Inter Bold"/>
+              </a:rPr>
+              <a:t>Code</a:t>
+            </a:r>
+          </a:p>
+        </p:txBody>
+      </p:sp>
+      <p:sp>
+        <p:nvSpPr>
+          <p:cNvPr id="12" name="TextBox 11"/>
+          <p:cNvSpPr txBox="1"/>
+          <p:nvPr/>
+        </p:nvSpPr>
+        <p:spPr>
+          <a:xfrm>
+            <a:off x="6919674" y="2856071"/>
+            <a:ext cx="6924437" cy="1015663"/>
+          </a:xfrm>
+          <a:prstGeom prst="rect">
+            <a:avLst/>
+          </a:prstGeom>
+          <a:noFill/>
+        </p:spPr>
+        <p:txBody>
+          <a:bodyPr wrap="square">
+            <a:spAutoFit/>
+          </a:bodyPr>
+          <a:lstStyle/>
+          <a:p>
+            <a:pPr algn="l"/>
+            <a:r>
+              <a:rPr sz="2000" dirty="0">
+                <a:solidFill>
+                  <a:srgbClr val="374151"/>
+                </a:solidFill>
+                <a:latin typeface="Inter"/>
+              </a:rPr>
+              <a:t>Think of a notebook </a:t>
+            </a:r>
+            <a:r>
+              <a:rPr lang="en-US" sz="2000" dirty="0">
+                <a:solidFill>
+                  <a:srgbClr val="374151"/>
+                </a:solidFill>
+                <a:latin typeface="Inter"/>
+              </a:rPr>
+              <a:t>(called a </a:t>
+            </a:r>
+            <a:r>
+              <a:rPr lang="en-US" sz="2000" dirty="0" err="1">
+                <a:solidFill>
+                  <a:srgbClr val="374151"/>
+                </a:solidFill>
+                <a:latin typeface="Inter"/>
+              </a:rPr>
+              <a:t>Jupyter</a:t>
+            </a:r>
+            <a:r>
+              <a:rPr lang="en-US" sz="2000" dirty="0">
+                <a:solidFill>
+                  <a:srgbClr val="374151"/>
+                </a:solidFill>
+                <a:latin typeface="Inter"/>
+              </a:rPr>
+              <a:t> notebook or </a:t>
+            </a:r>
+            <a:r>
+              <a:rPr lang="en-US" sz="2000" dirty="0" err="1">
+                <a:solidFill>
+                  <a:srgbClr val="374151"/>
+                </a:solidFill>
+                <a:latin typeface="Inter"/>
+              </a:rPr>
+              <a:t>Colab</a:t>
+            </a:r>
+            <a:r>
+              <a:rPr lang="en-US" sz="2000" dirty="0">
+                <a:solidFill>
+                  <a:srgbClr val="374151"/>
+                </a:solidFill>
+                <a:latin typeface="Inter"/>
+              </a:rPr>
+              <a:t> notebook) </a:t>
+            </a:r>
+            <a:r>
+              <a:rPr sz="2000" dirty="0">
+                <a:solidFill>
+                  <a:srgbClr val="374151"/>
+                </a:solidFill>
+                <a:latin typeface="Inter"/>
+              </a:rPr>
+              <a:t>as a conversation between you and a computer. Here's the workflow:</a:t>
+            </a:r>
+          </a:p>
+        </p:txBody>
+      </p:sp>
+      <p:sp>
+        <p:nvSpPr>
+          <p:cNvPr id="13" name="TextBox 12"/>
+          <p:cNvSpPr txBox="1"/>
+          <p:nvPr/>
+        </p:nvSpPr>
+        <p:spPr>
+          <a:xfrm>
+            <a:off x="6912173" y="4181609"/>
+            <a:ext cx="6924437" cy="1938992"/>
+          </a:xfrm>
+          <a:prstGeom prst="rect">
+            <a:avLst/>
+          </a:prstGeom>
+          <a:noFill/>
+        </p:spPr>
+        <p:txBody>
+          <a:bodyPr wrap="square">
+            <a:spAutoFit/>
+          </a:bodyPr>
+          <a:lstStyle/>
+          <a:p>
+            <a:pPr marL="457200" indent="-457200" algn="l">
+              <a:buFont typeface="+mj-lt"/>
+              <a:buAutoNum type="arabicPeriod"/>
+            </a:pPr>
+            <a:r>
+              <a:rPr sz="2000" dirty="0">
+                <a:solidFill>
+                  <a:srgbClr val="374151"/>
+                </a:solidFill>
+                <a:latin typeface="Inter"/>
+              </a:rPr>
+              <a:t>Your notebook transmits code to a runtime environment (called a kernel)</a:t>
+            </a:r>
+          </a:p>
+          <a:p>
+            <a:pPr marL="457200" indent="-457200" algn="l">
+              <a:buFont typeface="+mj-lt"/>
+              <a:buAutoNum type="arabicPeriod"/>
+            </a:pPr>
+            <a:r>
+              <a:rPr sz="2000" dirty="0">
+                <a:solidFill>
+                  <a:srgbClr val="374151"/>
+                </a:solidFill>
+                <a:latin typeface="Inter"/>
+              </a:rPr>
+              <a:t>The runtime processes and executes your code</a:t>
+            </a:r>
+          </a:p>
+          <a:p>
+            <a:pPr marL="457200" indent="-457200" algn="l">
+              <a:buFont typeface="+mj-lt"/>
+              <a:buAutoNum type="arabicPeriod"/>
+            </a:pPr>
+            <a:r>
+              <a:rPr sz="2000" dirty="0">
+                <a:solidFill>
+                  <a:srgbClr val="374151"/>
+                </a:solidFill>
+                <a:latin typeface="Inter"/>
+              </a:rPr>
+              <a:t>Results flow back to the notebook interface</a:t>
+            </a:r>
+          </a:p>
+          <a:p>
+            <a:pPr marL="457200" indent="-457200" algn="l">
+              <a:buFont typeface="+mj-lt"/>
+              <a:buAutoNum type="arabicPeriod"/>
+            </a:pPr>
+            <a:r>
+              <a:rPr sz="2000" dirty="0">
+                <a:solidFill>
+                  <a:srgbClr val="374151"/>
+                </a:solidFill>
+                <a:latin typeface="Inter"/>
+              </a:rPr>
+              <a:t>The notebook renders outputs, visualizations, and any error messages</a:t>
+            </a:r>
+          </a:p>
+        </p:txBody>
+      </p:sp>
     </p:spTree>
   </p:cSld>
   <p:clrMapOvr>

</xml_diff>